<commit_message>
fix issue #23 #24 #25 #26 #27 #28 #29
 #23 #24 #25 #26 #27 #28 #29
I Changed slide B and D
</commit_message>
<xml_diff>
--- a/Module-B-JPN-Basic-Workflow.pptx
+++ b/Module-B-JPN-Basic-Workflow.pptx
@@ -21070,19 +21070,25 @@
               <a:buAutoNum type="arabicPeriod"/>
             </a:pPr>
             <a:r>
-              <a:rPr lang="ja-JP" altLang="en-US" sz="1900" b="1" strike="noStrike" spc="-1" dirty="0" smtClean="0">
-                <a:solidFill>
-                  <a:srgbClr val="000000"/>
-                </a:solidFill>
-                <a:latin typeface="ＭＳ ゴシック" panose="020B0609070205080204" pitchFamily="49" charset="-128"/>
-                <a:ea typeface="ＭＳ ゴシック" panose="020B0609070205080204" pitchFamily="49" charset="-128"/>
-              </a:rPr>
-              <a:t>検知されたライセンスの全体レビュー</a:t>
-            </a:r>
-            <a:endParaRPr lang="en-US" sz="1900" b="0" strike="noStrike" spc="-1" dirty="0" smtClean="0">
-              <a:latin typeface="ＭＳ ゴシック" panose="020B0609070205080204" pitchFamily="49" charset="-128"/>
-              <a:ea typeface="ＭＳ ゴシック" panose="020B0609070205080204" pitchFamily="49" charset="-128"/>
-            </a:endParaRPr>
+              <a:rPr lang="en-US" altLang="ja-JP" sz="1900" b="1" spc="-1" dirty="0">
+                <a:solidFill>
+                  <a:srgbClr val="000000"/>
+                </a:solidFill>
+                <a:latin typeface="ＭＳ ゴシック" panose="020B0609070205080204" pitchFamily="49" charset="-128"/>
+                <a:ea typeface="ＭＳ ゴシック" panose="020B0609070205080204" pitchFamily="49" charset="-128"/>
+              </a:rPr>
+              <a:t>Aggregated view</a:t>
+            </a:r>
+            <a:r>
+              <a:rPr lang="ja-JP" altLang="en-US" sz="1900" b="1" spc="-1">
+                <a:solidFill>
+                  <a:srgbClr val="000000"/>
+                </a:solidFill>
+                <a:latin typeface="ＭＳ ゴシック" panose="020B0609070205080204" pitchFamily="49" charset="-128"/>
+                <a:ea typeface="ＭＳ ゴシック" panose="020B0609070205080204" pitchFamily="49" charset="-128"/>
+              </a:rPr>
+              <a:t>で、検出されたライセンスをレビュー</a:t>
+            </a:r>
           </a:p>
           <a:p>
             <a:pPr marL="343080" lvl="1" indent="-361080">
@@ -21099,6 +21105,16 @@
               <a:buAutoNum type="arabicPeriod"/>
             </a:pPr>
             <a:r>
+              <a:rPr lang="en-US" sz="1900" b="1" spc="-1" smtClean="0">
+                <a:solidFill>
+                  <a:srgbClr val="000000"/>
+                </a:solidFill>
+                <a:latin typeface="ＭＳ ゴシック" panose="020B0609070205080204" pitchFamily="49" charset="-128"/>
+                <a:ea typeface="ＭＳ ゴシック" panose="020B0609070205080204" pitchFamily="49" charset="-128"/>
+              </a:rPr>
+              <a:t>“</a:t>
+            </a:r>
+            <a:r>
               <a:rPr lang="en-US" sz="1900" b="1" spc="-1" dirty="0" smtClean="0">
                 <a:solidFill>
                   <a:srgbClr val="000000"/>
@@ -21106,7 +21122,7 @@
                 <a:latin typeface="ＭＳ ゴシック" panose="020B0609070205080204" pitchFamily="49" charset="-128"/>
                 <a:ea typeface="ＭＳ ゴシック" panose="020B0609070205080204" pitchFamily="49" charset="-128"/>
               </a:rPr>
-              <a:t>“Clearing” </a:t>
+              <a:t>Clearing” </a:t>
             </a:r>
             <a:r>
               <a:rPr lang="ja-JP" altLang="en-US" sz="1900" b="1" spc="-1" dirty="0" smtClean="0">

</xml_diff>